<commit_message>
Add In-Memory Database to KODEX example
</commit_message>
<xml_diff>
--- a/platform/examples/examples.KODEX/docs/Examples_KODEX.pptx
+++ b/platform/examples/examples.KODEX/docs/Examples_KODEX.pptx
@@ -261,7 +261,7 @@
           <a:p>
             <a:fld id="{D5B82AE6-E612-48AC-BCA1-8D558D7A7716}" type="datetimeFigureOut">
               <a:rPr lang="en-DE" smtClean="0"/>
-              <a:t>19/09/2022</a:t>
+              <a:t>02/11/2022</a:t>
             </a:fld>
             <a:endParaRPr lang="en-DE"/>
           </a:p>
@@ -315,7 +315,7 @@
           <a:p>
             <a:fld id="{A0229028-759D-4210-9927-1485AD01E42E}" type="slidenum">
               <a:rPr lang="en-DE" smtClean="0"/>
-              <a:t>‹Nr.›</a:t>
+              <a:t>‹#›</a:t>
             </a:fld>
             <a:endParaRPr lang="en-DE"/>
           </a:p>
@@ -461,7 +461,7 @@
           <a:p>
             <a:fld id="{D5B82AE6-E612-48AC-BCA1-8D558D7A7716}" type="datetimeFigureOut">
               <a:rPr lang="en-DE" smtClean="0"/>
-              <a:t>19/09/2022</a:t>
+              <a:t>02/11/2022</a:t>
             </a:fld>
             <a:endParaRPr lang="en-DE"/>
           </a:p>
@@ -515,7 +515,7 @@
           <a:p>
             <a:fld id="{A0229028-759D-4210-9927-1485AD01E42E}" type="slidenum">
               <a:rPr lang="en-DE" smtClean="0"/>
-              <a:t>‹Nr.›</a:t>
+              <a:t>‹#›</a:t>
             </a:fld>
             <a:endParaRPr lang="en-DE"/>
           </a:p>
@@ -671,7 +671,7 @@
           <a:p>
             <a:fld id="{D5B82AE6-E612-48AC-BCA1-8D558D7A7716}" type="datetimeFigureOut">
               <a:rPr lang="en-DE" smtClean="0"/>
-              <a:t>19/09/2022</a:t>
+              <a:t>02/11/2022</a:t>
             </a:fld>
             <a:endParaRPr lang="en-DE"/>
           </a:p>
@@ -725,7 +725,7 @@
           <a:p>
             <a:fld id="{A0229028-759D-4210-9927-1485AD01E42E}" type="slidenum">
               <a:rPr lang="en-DE" smtClean="0"/>
-              <a:t>‹Nr.›</a:t>
+              <a:t>‹#›</a:t>
             </a:fld>
             <a:endParaRPr lang="en-DE"/>
           </a:p>
@@ -871,7 +871,7 @@
           <a:p>
             <a:fld id="{D5B82AE6-E612-48AC-BCA1-8D558D7A7716}" type="datetimeFigureOut">
               <a:rPr lang="en-DE" smtClean="0"/>
-              <a:t>19/09/2022</a:t>
+              <a:t>02/11/2022</a:t>
             </a:fld>
             <a:endParaRPr lang="en-DE"/>
           </a:p>
@@ -925,7 +925,7 @@
           <a:p>
             <a:fld id="{A0229028-759D-4210-9927-1485AD01E42E}" type="slidenum">
               <a:rPr lang="en-DE" smtClean="0"/>
-              <a:t>‹Nr.›</a:t>
+              <a:t>‹#›</a:t>
             </a:fld>
             <a:endParaRPr lang="en-DE"/>
           </a:p>
@@ -1147,7 +1147,7 @@
           <a:p>
             <a:fld id="{D5B82AE6-E612-48AC-BCA1-8D558D7A7716}" type="datetimeFigureOut">
               <a:rPr lang="en-DE" smtClean="0"/>
-              <a:t>19/09/2022</a:t>
+              <a:t>02/11/2022</a:t>
             </a:fld>
             <a:endParaRPr lang="en-DE"/>
           </a:p>
@@ -1201,7 +1201,7 @@
           <a:p>
             <a:fld id="{A0229028-759D-4210-9927-1485AD01E42E}" type="slidenum">
               <a:rPr lang="en-DE" smtClean="0"/>
-              <a:t>‹Nr.›</a:t>
+              <a:t>‹#›</a:t>
             </a:fld>
             <a:endParaRPr lang="en-DE"/>
           </a:p>
@@ -1415,7 +1415,7 @@
           <a:p>
             <a:fld id="{D5B82AE6-E612-48AC-BCA1-8D558D7A7716}" type="datetimeFigureOut">
               <a:rPr lang="en-DE" smtClean="0"/>
-              <a:t>19/09/2022</a:t>
+              <a:t>02/11/2022</a:t>
             </a:fld>
             <a:endParaRPr lang="en-DE"/>
           </a:p>
@@ -1469,7 +1469,7 @@
           <a:p>
             <a:fld id="{A0229028-759D-4210-9927-1485AD01E42E}" type="slidenum">
               <a:rPr lang="en-DE" smtClean="0"/>
-              <a:t>‹Nr.›</a:t>
+              <a:t>‹#›</a:t>
             </a:fld>
             <a:endParaRPr lang="en-DE"/>
           </a:p>
@@ -1830,7 +1830,7 @@
           <a:p>
             <a:fld id="{D5B82AE6-E612-48AC-BCA1-8D558D7A7716}" type="datetimeFigureOut">
               <a:rPr lang="en-DE" smtClean="0"/>
-              <a:t>19/09/2022</a:t>
+              <a:t>02/11/2022</a:t>
             </a:fld>
             <a:endParaRPr lang="en-DE"/>
           </a:p>
@@ -1884,7 +1884,7 @@
           <a:p>
             <a:fld id="{A0229028-759D-4210-9927-1485AD01E42E}" type="slidenum">
               <a:rPr lang="en-DE" smtClean="0"/>
-              <a:t>‹Nr.›</a:t>
+              <a:t>‹#›</a:t>
             </a:fld>
             <a:endParaRPr lang="en-DE"/>
           </a:p>
@@ -1972,7 +1972,7 @@
           <a:p>
             <a:fld id="{D5B82AE6-E612-48AC-BCA1-8D558D7A7716}" type="datetimeFigureOut">
               <a:rPr lang="en-DE" smtClean="0"/>
-              <a:t>19/09/2022</a:t>
+              <a:t>02/11/2022</a:t>
             </a:fld>
             <a:endParaRPr lang="en-DE"/>
           </a:p>
@@ -2026,7 +2026,7 @@
           <a:p>
             <a:fld id="{A0229028-759D-4210-9927-1485AD01E42E}" type="slidenum">
               <a:rPr lang="en-DE" smtClean="0"/>
-              <a:t>‹Nr.›</a:t>
+              <a:t>‹#›</a:t>
             </a:fld>
             <a:endParaRPr lang="en-DE"/>
           </a:p>
@@ -2085,7 +2085,7 @@
           <a:p>
             <a:fld id="{D5B82AE6-E612-48AC-BCA1-8D558D7A7716}" type="datetimeFigureOut">
               <a:rPr lang="en-DE" smtClean="0"/>
-              <a:t>19/09/2022</a:t>
+              <a:t>02/11/2022</a:t>
             </a:fld>
             <a:endParaRPr lang="en-DE"/>
           </a:p>
@@ -2139,7 +2139,7 @@
           <a:p>
             <a:fld id="{A0229028-759D-4210-9927-1485AD01E42E}" type="slidenum">
               <a:rPr lang="en-DE" smtClean="0"/>
-              <a:t>‹Nr.›</a:t>
+              <a:t>‹#›</a:t>
             </a:fld>
             <a:endParaRPr lang="en-DE"/>
           </a:p>
@@ -2398,7 +2398,7 @@
           <a:p>
             <a:fld id="{D5B82AE6-E612-48AC-BCA1-8D558D7A7716}" type="datetimeFigureOut">
               <a:rPr lang="en-DE" smtClean="0"/>
-              <a:t>19/09/2022</a:t>
+              <a:t>02/11/2022</a:t>
             </a:fld>
             <a:endParaRPr lang="en-DE"/>
           </a:p>
@@ -2452,7 +2452,7 @@
           <a:p>
             <a:fld id="{A0229028-759D-4210-9927-1485AD01E42E}" type="slidenum">
               <a:rPr lang="en-DE" smtClean="0"/>
-              <a:t>‹Nr.›</a:t>
+              <a:t>‹#›</a:t>
             </a:fld>
             <a:endParaRPr lang="en-DE"/>
           </a:p>
@@ -2687,7 +2687,7 @@
           <a:p>
             <a:fld id="{D5B82AE6-E612-48AC-BCA1-8D558D7A7716}" type="datetimeFigureOut">
               <a:rPr lang="en-DE" smtClean="0"/>
-              <a:t>19/09/2022</a:t>
+              <a:t>02/11/2022</a:t>
             </a:fld>
             <a:endParaRPr lang="en-DE"/>
           </a:p>
@@ -2741,7 +2741,7 @@
           <a:p>
             <a:fld id="{A0229028-759D-4210-9927-1485AD01E42E}" type="slidenum">
               <a:rPr lang="en-DE" smtClean="0"/>
-              <a:t>‹Nr.›</a:t>
+              <a:t>‹#›</a:t>
             </a:fld>
             <a:endParaRPr lang="en-DE"/>
           </a:p>
@@ -2930,7 +2930,7 @@
           <a:p>
             <a:fld id="{D5B82AE6-E612-48AC-BCA1-8D558D7A7716}" type="datetimeFigureOut">
               <a:rPr lang="en-DE" smtClean="0"/>
-              <a:t>19/09/2022</a:t>
+              <a:t>02/11/2022</a:t>
             </a:fld>
             <a:endParaRPr lang="en-DE"/>
           </a:p>
@@ -3020,7 +3020,7 @@
           <a:p>
             <a:fld id="{A0229028-759D-4210-9927-1485AD01E42E}" type="slidenum">
               <a:rPr lang="en-DE" smtClean="0"/>
-              <a:t>‹Nr.›</a:t>
+              <a:t>‹#›</a:t>
             </a:fld>
             <a:endParaRPr lang="en-DE"/>
           </a:p>
@@ -3428,7 +3428,7 @@
           <a:lstStyle/>
           <a:p>
             <a:r>
-              <a:rPr lang="en-GB" dirty="0" err="1" smtClean="0"/>
+              <a:rPr lang="en-GB" dirty="0" err="1"/>
               <a:t>Examples.KODEX</a:t>
             </a:r>
             <a:endParaRPr lang="en-DE" sz="3000" dirty="0"/>
@@ -3508,13 +3508,38 @@
               <a:t> which communicates the anonymized data to the platform </a:t>
             </a:r>
             <a:r>
-              <a:rPr lang="en-GB" sz="2000" b="1" dirty="0"/>
-              <a:t>Console</a:t>
-            </a:r>
-            <a:r>
-              <a:rPr lang="en-GB" sz="2000" dirty="0"/>
-              <a:t>. </a:t>
-            </a:r>
+              <a:rPr lang="en-GB" sz="2000" b="1" dirty="0">
+                <a:solidFill>
+                  <a:prstClr val="black"/>
+                </a:solidFill>
+              </a:rPr>
+              <a:t>Console </a:t>
+            </a:r>
+            <a:r>
+              <a:rPr lang="en-GB" sz="2000" dirty="0">
+                <a:solidFill>
+                  <a:prstClr val="black"/>
+                </a:solidFill>
+              </a:rPr>
+              <a:t>and store it in </a:t>
+            </a:r>
+            <a:r>
+              <a:rPr lang="en-GB" sz="2000" b="1" dirty="0">
+                <a:solidFill>
+                  <a:prstClr val="black"/>
+                </a:solidFill>
+              </a:rPr>
+              <a:t>In-Memory Database </a:t>
+            </a:r>
+            <a:r>
+              <a:rPr lang="en-GB" sz="2000" dirty="0">
+                <a:solidFill>
+                  <a:prstClr val="black"/>
+                </a:solidFill>
+              </a:rPr>
+              <a:t>(H2 In-Memory Database). </a:t>
+            </a:r>
+            <a:endParaRPr lang="en-GB" sz="2000" dirty="0"/>
           </a:p>
         </p:txBody>
       </p:sp>
@@ -3942,8 +3967,8 @@
         </p:nvSpPr>
         <p:spPr>
           <a:xfrm>
-            <a:off x="10697210" y="2728890"/>
-            <a:ext cx="1207190" cy="923330"/>
+            <a:off x="10697209" y="2728890"/>
+            <a:ext cx="1416509" cy="923330"/>
           </a:xfrm>
           <a:prstGeom prst="rect">
             <a:avLst/>
@@ -3956,7 +3981,7 @@
           </a:ln>
         </p:spPr>
         <p:txBody>
-          <a:bodyPr wrap="none" rtlCol="0">
+          <a:bodyPr wrap="square" rtlCol="0">
             <a:spAutoFit/>
           </a:bodyPr>
           <a:lstStyle/>
@@ -4167,15 +4192,14 @@
           </p:cNvPr>
           <p:cNvCxnSpPr>
             <a:cxnSpLocks/>
-            <a:stCxn id="41" idx="2"/>
             <a:endCxn id="21" idx="0"/>
           </p:cNvCxnSpPr>
           <p:nvPr/>
         </p:nvCxnSpPr>
         <p:spPr>
           <a:xfrm>
-            <a:off x="9458394" y="3516661"/>
-            <a:ext cx="0" cy="784830"/>
+            <a:off x="9100590" y="3513719"/>
+            <a:ext cx="0" cy="787772"/>
           </a:xfrm>
           <a:prstGeom prst="straightConnector1">
             <a:avLst/>
@@ -4214,7 +4238,7 @@
         </p:nvSpPr>
         <p:spPr>
           <a:xfrm>
-            <a:off x="8265920" y="4301491"/>
+            <a:off x="7908116" y="4301491"/>
             <a:ext cx="2384948" cy="323165"/>
           </a:xfrm>
           <a:prstGeom prst="rect">
@@ -4260,7 +4284,7 @@
         <p:spPr>
           <a:xfrm flipV="1">
             <a:off x="10317636" y="3190555"/>
-            <a:ext cx="379574" cy="2941"/>
+            <a:ext cx="379573" cy="2941"/>
           </a:xfrm>
           <a:prstGeom prst="bentConnector3">
             <a:avLst>
@@ -4456,6 +4480,186 @@
           </a:fontRef>
         </p:style>
       </p:cxnSp>
+      <p:sp>
+        <p:nvSpPr>
+          <p:cNvPr id="26" name="TextBox 33">
+            <a:extLst>
+              <a:ext uri="{FF2B5EF4-FFF2-40B4-BE49-F238E27FC236}">
+                <a16:creationId xmlns:a16="http://schemas.microsoft.com/office/drawing/2014/main" id="{E1D1FADE-DB55-4567-B10B-A9172C0AFA40}"/>
+              </a:ext>
+            </a:extLst>
+          </p:cNvPr>
+          <p:cNvSpPr txBox="1"/>
+          <p:nvPr/>
+        </p:nvSpPr>
+        <p:spPr>
+          <a:xfrm>
+            <a:off x="10751802" y="3826440"/>
+            <a:ext cx="1361917" cy="923330"/>
+          </a:xfrm>
+          <a:prstGeom prst="rect">
+            <a:avLst/>
+          </a:prstGeom>
+          <a:noFill/>
+          <a:ln>
+            <a:solidFill>
+              <a:srgbClr val="4472C4"/>
+            </a:solidFill>
+          </a:ln>
+        </p:spPr>
+        <p:txBody>
+          <a:bodyPr wrap="square" rtlCol="0">
+            <a:spAutoFit/>
+          </a:bodyPr>
+          <a:lstStyle/>
+          <a:p>
+            <a:pPr marL="0" marR="0" lvl="0" indent="0" defTabSz="914400" rtl="0" eaLnBrk="1" fontAlgn="auto" latinLnBrk="0" hangingPunct="1">
+              <a:lnSpc>
+                <a:spcPct val="100000"/>
+              </a:lnSpc>
+              <a:spcBef>
+                <a:spcPts val="0"/>
+              </a:spcBef>
+              <a:spcAft>
+                <a:spcPts val="0"/>
+              </a:spcAft>
+              <a:buClrTx/>
+              <a:buSzTx/>
+              <a:buFontTx/>
+              <a:buNone/>
+              <a:tabLst/>
+              <a:defRPr/>
+            </a:pPr>
+            <a:r>
+              <a:rPr kumimoji="0" lang="en-GB" sz="1800" b="1" i="0" u="none" strike="noStrike" kern="1200" cap="none" spc="0" normalizeH="0" baseline="0" noProof="0" dirty="0">
+                <a:ln>
+                  <a:noFill/>
+                </a:ln>
+                <a:solidFill>
+                  <a:prstClr val="black"/>
+                </a:solidFill>
+                <a:effectLst/>
+                <a:uLnTx/>
+                <a:uFillTx/>
+                <a:latin typeface="Calibri" panose="020F0502020204030204"/>
+              </a:rPr>
+              <a:t>In-Memory</a:t>
+            </a:r>
+            <a:br>
+              <a:rPr kumimoji="0" lang="en-GB" sz="1800" b="1" i="0" u="none" strike="noStrike" kern="1200" cap="none" spc="0" normalizeH="0" baseline="0" noProof="0" dirty="0">
+                <a:ln>
+                  <a:noFill/>
+                </a:ln>
+                <a:solidFill>
+                  <a:prstClr val="black"/>
+                </a:solidFill>
+                <a:effectLst/>
+                <a:uLnTx/>
+                <a:uFillTx/>
+                <a:latin typeface="Calibri" panose="020F0502020204030204"/>
+              </a:rPr>
+            </a:br>
+            <a:r>
+              <a:rPr kumimoji="0" lang="en-GB" sz="1800" b="1" i="0" u="none" strike="noStrike" kern="1200" cap="none" spc="0" normalizeH="0" baseline="0" noProof="0" dirty="0">
+                <a:ln>
+                  <a:noFill/>
+                </a:ln>
+                <a:solidFill>
+                  <a:prstClr val="black"/>
+                </a:solidFill>
+                <a:effectLst/>
+                <a:uLnTx/>
+                <a:uFillTx/>
+                <a:latin typeface="Calibri" panose="020F0502020204030204"/>
+              </a:rPr>
+              <a:t>Database </a:t>
+            </a:r>
+            <a:endParaRPr kumimoji="0" lang="de-DE" sz="1800" b="0" i="0" u="none" strike="noStrike" kern="1200" cap="none" spc="0" normalizeH="0" baseline="0" noProof="0" dirty="0">
+              <a:ln>
+                <a:noFill/>
+              </a:ln>
+              <a:solidFill>
+                <a:prstClr val="black"/>
+              </a:solidFill>
+              <a:effectLst/>
+              <a:uLnTx/>
+              <a:uFillTx/>
+              <a:latin typeface="Calibri" panose="020F0502020204030204"/>
+            </a:endParaRPr>
+          </a:p>
+          <a:p>
+            <a:pPr marL="0" marR="0" lvl="0" indent="0" defTabSz="914400" rtl="0" eaLnBrk="1" fontAlgn="auto" latinLnBrk="0" hangingPunct="1">
+              <a:lnSpc>
+                <a:spcPct val="100000"/>
+              </a:lnSpc>
+              <a:spcBef>
+                <a:spcPts val="0"/>
+              </a:spcBef>
+              <a:spcAft>
+                <a:spcPts val="0"/>
+              </a:spcAft>
+              <a:buClrTx/>
+              <a:buSzTx/>
+              <a:buFontTx/>
+              <a:buNone/>
+              <a:tabLst/>
+              <a:defRPr/>
+            </a:pPr>
+            <a:r>
+              <a:rPr kumimoji="0" lang="en-GB" sz="1800" b="0" i="0" u="none" strike="noStrike" kern="1200" cap="none" spc="0" normalizeH="0" baseline="0" noProof="0" dirty="0">
+                <a:ln>
+                  <a:noFill/>
+                </a:ln>
+                <a:solidFill>
+                  <a:prstClr val="black"/>
+                </a:solidFill>
+                <a:effectLst/>
+                <a:uLnTx/>
+                <a:uFillTx/>
+                <a:latin typeface="Calibri" panose="020F0502020204030204"/>
+              </a:rPr>
+              <a:t>Java, async</a:t>
+            </a:r>
+          </a:p>
+        </p:txBody>
+      </p:sp>
+      <p:cxnSp>
+        <p:nvCxnSpPr>
+          <p:cNvPr id="27" name="Connector: Elbow 38">
+            <a:extLst>
+              <a:ext uri="{FF2B5EF4-FFF2-40B4-BE49-F238E27FC236}">
+                <a16:creationId xmlns:a16="http://schemas.microsoft.com/office/drawing/2014/main" id="{37069FE7-E2CD-49DA-80BC-BD2B1DB67B59}"/>
+              </a:ext>
+            </a:extLst>
+          </p:cNvPr>
+          <p:cNvCxnSpPr>
+            <a:cxnSpLocks/>
+            <a:endCxn id="26" idx="1"/>
+          </p:cNvCxnSpPr>
+          <p:nvPr/>
+        </p:nvCxnSpPr>
+        <p:spPr>
+          <a:xfrm>
+            <a:off x="10317636" y="3193496"/>
+            <a:ext cx="434166" cy="1094609"/>
+          </a:xfrm>
+          <a:prstGeom prst="bentConnector3">
+            <a:avLst>
+              <a:gd name="adj1" fmla="val 50000"/>
+            </a:avLst>
+          </a:prstGeom>
+          <a:noFill/>
+          <a:ln w="6350" cap="flat" cmpd="sng" algn="ctr">
+            <a:solidFill>
+              <a:srgbClr val="4472C4"/>
+            </a:solidFill>
+            <a:prstDash val="solid"/>
+            <a:miter lim="800000"/>
+            <a:tailEnd type="triangle"/>
+          </a:ln>
+          <a:effectLst/>
+        </p:spPr>
+      </p:cxnSp>
     </p:spTree>
     <p:extLst>
       <p:ext uri="{BB962C8B-B14F-4D97-AF65-F5344CB8AC3E}">
@@ -4466,13 +4670,6 @@
   <p:clrMapOvr>
     <a:masterClrMapping/>
   </p:clrMapOvr>
-  <p:timing>
-    <p:tnLst>
-      <p:par>
-        <p:cTn id="1" dur="indefinite" restart="never" nodeType="tmRoot"/>
-      </p:par>
-    </p:tnLst>
-  </p:timing>
 </p:sld>
 </file>
 

</xml_diff>